<commit_message>
decrese size a little
</commit_message>
<xml_diff>
--- a/img/no-pfs.pptx
+++ b/img/no-pfs.pptx
@@ -151,7 +151,7 @@
       </p14:sectionLst>
     </p:ext>
     <p:ext uri="{EFAFB233-063F-42B5-8137-9DF3F51BA10A}">
-      <p15:sldGuideLst xmlns:p15="http://schemas.microsoft.com/office/powerpoint/2012/main" xmlns="">
+      <p15:sldGuideLst xmlns="" xmlns:p15="http://schemas.microsoft.com/office/powerpoint/2012/main">
         <p15:guide id="1" orient="horz" pos="2160">
           <p15:clr>
             <a:srgbClr val="A4A3A4"/>
@@ -165,7 +165,7 @@
       </p15:sldGuideLst>
     </p:ext>
     <p:ext uri="{2D200454-40CA-4A62-9FC3-DE9A4176ACB9}">
-      <p15:notesGuideLst xmlns:p15="http://schemas.microsoft.com/office/powerpoint/2012/main" xmlns="">
+      <p15:notesGuideLst xmlns="" xmlns:p15="http://schemas.microsoft.com/office/powerpoint/2012/main">
         <p15:guide id="1" orient="horz" pos="3223">
           <p15:clr>
             <a:srgbClr val="A4A3A4"/>
@@ -1963,7 +1963,7 @@
           <a:prstGeom prst="straightConnector1">
             <a:avLst/>
           </a:prstGeom>
-          <a:ln w="9525">
+          <a:ln w="3175">
             <a:solidFill>
               <a:schemeClr val="tx1"/>
             </a:solidFill>
@@ -1994,7 +1994,7 @@
         <p:spPr>
           <a:xfrm>
             <a:off x="173480" y="1335509"/>
-            <a:ext cx="617477" cy="276999"/>
+            <a:ext cx="564578" cy="253916"/>
           </a:xfrm>
           <a:prstGeom prst="rect">
             <a:avLst/>
@@ -2012,7 +2012,7 @@
           <a:lstStyle/>
           <a:p>
             <a:r>
-              <a:rPr lang="en-US" altLang="ja-JP" sz="1200" smtClean="0">
+              <a:rPr lang="en-US" altLang="ja-JP" sz="1050" smtClean="0">
                 <a:latin typeface="HG丸ｺﾞｼｯｸM-PRO" panose="020F0600000000000000" pitchFamily="50" charset="-128"/>
                 <a:ea typeface="HG丸ｺﾞｼｯｸM-PRO" panose="020F0600000000000000" pitchFamily="50" charset="-128"/>
                 <a:cs typeface="Courier New" pitchFamily="49" charset="0"/>
@@ -2020,14 +2020,14 @@
               <a:t>A</a:t>
             </a:r>
             <a:r>
-              <a:rPr lang="ja-JP" altLang="en-US" sz="1200" smtClean="0">
+              <a:rPr lang="ja-JP" altLang="en-US" sz="1050" smtClean="0">
                 <a:latin typeface="HG丸ｺﾞｼｯｸM-PRO" panose="020F0600000000000000" pitchFamily="50" charset="-128"/>
                 <a:ea typeface="HG丸ｺﾞｼｯｸM-PRO" panose="020F0600000000000000" pitchFamily="50" charset="-128"/>
                 <a:cs typeface="Courier New" pitchFamily="49" charset="0"/>
               </a:rPr>
               <a:t>さん</a:t>
             </a:r>
-            <a:endParaRPr lang="ja-JP" altLang="en-US" sz="1200">
+            <a:endParaRPr lang="ja-JP" altLang="en-US" sz="1050">
               <a:latin typeface="HG丸ｺﾞｼｯｸM-PRO" panose="020F0600000000000000" pitchFamily="50" charset="-128"/>
               <a:ea typeface="HG丸ｺﾞｼｯｸM-PRO" panose="020F0600000000000000" pitchFamily="50" charset="-128"/>
               <a:cs typeface="Courier New" pitchFamily="49" charset="0"/>
@@ -2044,7 +2044,7 @@
         <p:spPr>
           <a:xfrm>
             <a:off x="3432194" y="1335509"/>
-            <a:ext cx="607859" cy="276999"/>
+            <a:ext cx="554960" cy="253916"/>
           </a:xfrm>
           <a:prstGeom prst="rect">
             <a:avLst/>
@@ -2062,7 +2062,7 @@
           <a:lstStyle/>
           <a:p>
             <a:r>
-              <a:rPr lang="en-US" altLang="ja-JP" sz="1200" smtClean="0">
+              <a:rPr lang="en-US" altLang="ja-JP" sz="1050" smtClean="0">
                 <a:latin typeface="HG丸ｺﾞｼｯｸM-PRO" panose="020F0600000000000000" pitchFamily="50" charset="-128"/>
                 <a:ea typeface="HG丸ｺﾞｼｯｸM-PRO" panose="020F0600000000000000" pitchFamily="50" charset="-128"/>
                 <a:cs typeface="Courier New" pitchFamily="49" charset="0"/>
@@ -2070,14 +2070,14 @@
               <a:t>B</a:t>
             </a:r>
             <a:r>
-              <a:rPr lang="ja-JP" altLang="en-US" sz="1200" smtClean="0">
+              <a:rPr lang="ja-JP" altLang="en-US" sz="1050" smtClean="0">
                 <a:latin typeface="HG丸ｺﾞｼｯｸM-PRO" panose="020F0600000000000000" pitchFamily="50" charset="-128"/>
                 <a:ea typeface="HG丸ｺﾞｼｯｸM-PRO" panose="020F0600000000000000" pitchFamily="50" charset="-128"/>
                 <a:cs typeface="Courier New" pitchFamily="49" charset="0"/>
               </a:rPr>
               <a:t>さん</a:t>
             </a:r>
-            <a:endParaRPr lang="ja-JP" altLang="en-US" sz="1200">
+            <a:endParaRPr lang="ja-JP" altLang="en-US" sz="1050">
               <a:latin typeface="HG丸ｺﾞｼｯｸM-PRO" panose="020F0600000000000000" pitchFamily="50" charset="-128"/>
               <a:ea typeface="HG丸ｺﾞｼｯｸM-PRO" panose="020F0600000000000000" pitchFamily="50" charset="-128"/>
               <a:cs typeface="Courier New" pitchFamily="49" charset="0"/>
@@ -2085,8 +2085,8 @@
           </a:p>
         </p:txBody>
       </p:sp>
-      <mc:AlternateContent xmlns:mc="http://schemas.openxmlformats.org/markup-compatibility/2006" xmlns:a14="http://schemas.microsoft.com/office/drawing/2010/main">
-        <mc:Choice Requires="a14">
+      <mc:AlternateContent xmlns:mc="http://schemas.openxmlformats.org/markup-compatibility/2006">
+        <mc:Choice xmlns:a14="http://schemas.microsoft.com/office/drawing/2010/main" Requires="a14">
           <p:sp>
             <p:nvSpPr>
               <p:cNvPr id="15" name="テキスト ボックス 14"/>
@@ -2096,7 +2096,7 @@
             <p:spPr>
               <a:xfrm>
                 <a:off x="0" y="1725891"/>
-                <a:ext cx="936000" cy="292901"/>
+                <a:ext cx="936000" cy="267766"/>
               </a:xfrm>
               <a:prstGeom prst="rect">
                 <a:avLst/>
@@ -2121,7 +2121,7 @@
                     </m:oMathParaPr>
                     <m:oMath xmlns:m="http://schemas.openxmlformats.org/officeDocument/2006/math">
                       <m:r>
-                        <a:rPr lang="en-US" altLang="ja-JP" sz="1200" b="0" i="1" smtClean="0">
+                        <a:rPr lang="en-US" altLang="ja-JP" sz="1050" b="0" i="1" smtClean="0">
                           <a:latin typeface="Cambria Math"/>
                           <a:ea typeface="HG丸ｺﾞｼｯｸM-PRO" panose="020F0600000000000000" pitchFamily="50" charset="-128"/>
                           <a:cs typeface="Courier New" pitchFamily="49" charset="0"/>
@@ -2131,7 +2131,7 @@
                       <m:sSub>
                         <m:sSubPr>
                           <m:ctrlPr>
-                            <a:rPr lang="en-US" altLang="ja-JP" sz="1200" b="0" i="1" smtClean="0">
+                            <a:rPr lang="en-US" altLang="ja-JP" sz="1050" b="0" i="1" smtClean="0">
                               <a:latin typeface="Cambria Math"/>
                               <a:ea typeface="HG丸ｺﾞｼｯｸM-PRO" panose="020F0600000000000000" pitchFamily="50" charset="-128"/>
                               <a:cs typeface="Courier New" pitchFamily="49" charset="0"/>
@@ -2140,7 +2140,7 @@
                         </m:sSubPr>
                         <m:e>
                           <m:r>
-                            <a:rPr lang="en-US" altLang="ja-JP" sz="1200" b="0" i="1" smtClean="0">
+                            <a:rPr lang="en-US" altLang="ja-JP" sz="1050" b="0" i="1" smtClean="0">
                               <a:latin typeface="Cambria Math"/>
                               <a:ea typeface="HG丸ｺﾞｼｯｸM-PRO" panose="020F0600000000000000" pitchFamily="50" charset="-128"/>
                               <a:cs typeface="Courier New" pitchFamily="49" charset="0"/>
@@ -2152,7 +2152,7 @@
                           <m:sSub>
                             <m:sSubPr>
                               <m:ctrlPr>
-                                <a:rPr lang="en-US" altLang="ja-JP" sz="1200" b="0" i="1" smtClean="0">
+                                <a:rPr lang="en-US" altLang="ja-JP" sz="1050" b="0" i="1" smtClean="0">
                                   <a:latin typeface="Cambria Math"/>
                                   <a:ea typeface="HG丸ｺﾞｼｯｸM-PRO" panose="020F0600000000000000" pitchFamily="50" charset="-128"/>
                                   <a:cs typeface="Courier New" pitchFamily="49" charset="0"/>
@@ -2161,7 +2161,7 @@
                             </m:sSubPr>
                             <m:e>
                               <m:r>
-                                <a:rPr lang="en-US" altLang="ja-JP" sz="1200" b="0" i="1" smtClean="0">
+                                <a:rPr lang="en-US" altLang="ja-JP" sz="1050" b="0" i="1" smtClean="0">
                                   <a:latin typeface="Cambria Math"/>
                                   <a:ea typeface="HG丸ｺﾞｼｯｸM-PRO" panose="020F0600000000000000" pitchFamily="50" charset="-128"/>
                                   <a:cs typeface="Courier New" pitchFamily="49" charset="0"/>
@@ -2171,7 +2171,7 @@
                             </m:e>
                             <m:sub>
                               <m:r>
-                                <a:rPr lang="en-US" altLang="ja-JP" sz="1200" b="0" i="1" smtClean="0">
+                                <a:rPr lang="en-US" altLang="ja-JP" sz="1050" b="0" i="1" smtClean="0">
                                   <a:latin typeface="Cambria Math"/>
                                   <a:ea typeface="HG丸ｺﾞｼｯｸM-PRO" panose="020F0600000000000000" pitchFamily="50" charset="-128"/>
                                   <a:cs typeface="Courier New" pitchFamily="49" charset="0"/>
@@ -2183,7 +2183,7 @@
                         </m:sub>
                       </m:sSub>
                       <m:r>
-                        <a:rPr lang="en-US" altLang="ja-JP" sz="1200" b="0" i="1" smtClean="0">
+                        <a:rPr lang="en-US" altLang="ja-JP" sz="1050" b="0" i="1" smtClean="0">
                           <a:latin typeface="Cambria Math"/>
                           <a:ea typeface="HG丸ｺﾞｼｯｸM-PRO" panose="020F0600000000000000" pitchFamily="50" charset="-128"/>
                           <a:cs typeface="Courier New" pitchFamily="49" charset="0"/>
@@ -2193,7 +2193,7 @@
                       <m:sSub>
                         <m:sSubPr>
                           <m:ctrlPr>
-                            <a:rPr lang="en-US" altLang="ja-JP" sz="1200" b="0" i="1" smtClean="0">
+                            <a:rPr lang="en-US" altLang="ja-JP" sz="1050" b="0" i="1" smtClean="0">
                               <a:latin typeface="Cambria Math"/>
                               <a:ea typeface="HG丸ｺﾞｼｯｸM-PRO" panose="020F0600000000000000" pitchFamily="50" charset="-128"/>
                               <a:cs typeface="Courier New" pitchFamily="49" charset="0"/>
@@ -2202,7 +2202,7 @@
                         </m:sSubPr>
                         <m:e>
                           <m:r>
-                            <a:rPr lang="en-US" altLang="ja-JP" sz="1200" b="0" i="1" smtClean="0">
+                            <a:rPr lang="en-US" altLang="ja-JP" sz="1050" b="0" i="1" smtClean="0">
                               <a:latin typeface="Cambria Math"/>
                               <a:ea typeface="HG丸ｺﾞｼｯｸM-PRO" panose="020F0600000000000000" pitchFamily="50" charset="-128"/>
                               <a:cs typeface="Courier New" pitchFamily="49" charset="0"/>
@@ -2212,7 +2212,7 @@
                         </m:e>
                         <m:sub>
                           <m:r>
-                            <a:rPr lang="en-US" altLang="ja-JP" sz="1200" b="0" i="1" smtClean="0">
+                            <a:rPr lang="en-US" altLang="ja-JP" sz="1050" b="0" i="1" smtClean="0">
                               <a:latin typeface="Cambria Math"/>
                               <a:ea typeface="HG丸ｺﾞｼｯｸM-PRO" panose="020F0600000000000000" pitchFamily="50" charset="-128"/>
                               <a:cs typeface="Courier New" pitchFamily="49" charset="0"/>
@@ -2222,7 +2222,7 @@
                         </m:sub>
                       </m:sSub>
                       <m:r>
-                        <a:rPr lang="en-US" altLang="ja-JP" sz="1200" b="0" i="1" smtClean="0">
+                        <a:rPr lang="en-US" altLang="ja-JP" sz="1050" b="0" i="1" smtClean="0">
                           <a:latin typeface="Cambria Math"/>
                           <a:ea typeface="HG丸ｺﾞｼｯｸM-PRO" panose="020F0600000000000000" pitchFamily="50" charset="-128"/>
                           <a:cs typeface="Courier New" pitchFamily="49" charset="0"/>
@@ -2232,7 +2232,7 @@
                     </m:oMath>
                   </m:oMathPara>
                 </a14:m>
-                <a:endParaRPr lang="ja-JP" altLang="en-US" sz="1200">
+                <a:endParaRPr lang="ja-JP" altLang="en-US" sz="1050">
                   <a:latin typeface="HG丸ｺﾞｼｯｸM-PRO" panose="020F0600000000000000" pitchFamily="50" charset="-128"/>
                   <a:ea typeface="HG丸ｺﾞｼｯｸM-PRO" panose="020F0600000000000000" pitchFamily="50" charset="-128"/>
                   <a:cs typeface="Courier New" pitchFamily="49" charset="0"/>
@@ -2241,7 +2241,7 @@
             </p:txBody>
           </p:sp>
         </mc:Choice>
-        <mc:Fallback xmlns="">
+        <mc:Fallback>
           <p:sp>
             <p:nvSpPr>
               <p:cNvPr id="15" name="テキスト ボックス 14"/>
@@ -2253,7 +2253,7 @@
             <p:spPr>
               <a:xfrm>
                 <a:off x="0" y="1725891"/>
-                <a:ext cx="936000" cy="292901"/>
+                <a:ext cx="936000" cy="267766"/>
               </a:xfrm>
               <a:prstGeom prst="rect">
                 <a:avLst/>
@@ -2261,7 +2261,7 @@
               <a:blipFill rotWithShape="1">
                 <a:blip r:embed="rId2"/>
                 <a:stretch>
-                  <a:fillRect b="-4167"/>
+                  <a:fillRect/>
                 </a:stretch>
               </a:blipFill>
               <a:ln w="12700" cap="rnd">
@@ -2284,8 +2284,8 @@
           </p:sp>
         </mc:Fallback>
       </mc:AlternateContent>
-      <mc:AlternateContent xmlns:mc="http://schemas.openxmlformats.org/markup-compatibility/2006" xmlns:a14="http://schemas.microsoft.com/office/drawing/2010/main">
-        <mc:Choice Requires="a14">
+      <mc:AlternateContent xmlns:mc="http://schemas.openxmlformats.org/markup-compatibility/2006">
+        <mc:Choice xmlns:a14="http://schemas.microsoft.com/office/drawing/2010/main" Requires="a14">
           <p:sp>
             <p:nvSpPr>
               <p:cNvPr id="17" name="テキスト ボックス 16"/>
@@ -2295,7 +2295,7 @@
             <p:spPr>
               <a:xfrm>
                 <a:off x="0" y="2140447"/>
-                <a:ext cx="936000" cy="292901"/>
+                <a:ext cx="936000" cy="267766"/>
               </a:xfrm>
               <a:prstGeom prst="rect">
                 <a:avLst/>
@@ -2320,7 +2320,7 @@
                     </m:oMathParaPr>
                     <m:oMath xmlns:m="http://schemas.openxmlformats.org/officeDocument/2006/math">
                       <m:r>
-                        <a:rPr lang="en-US" altLang="ja-JP" sz="1200" b="0" i="1" smtClean="0">
+                        <a:rPr lang="en-US" altLang="ja-JP" sz="1050" b="0" i="1" smtClean="0">
                           <a:latin typeface="Cambria Math"/>
                           <a:ea typeface="HG丸ｺﾞｼｯｸM-PRO" panose="020F0600000000000000" pitchFamily="50" charset="-128"/>
                           <a:cs typeface="Courier New" pitchFamily="49" charset="0"/>
@@ -2330,7 +2330,7 @@
                       <m:sSub>
                         <m:sSubPr>
                           <m:ctrlPr>
-                            <a:rPr lang="en-US" altLang="ja-JP" sz="1200" b="0" i="1" smtClean="0">
+                            <a:rPr lang="en-US" altLang="ja-JP" sz="1050" b="0" i="1" smtClean="0">
                               <a:latin typeface="Cambria Math"/>
                               <a:ea typeface="HG丸ｺﾞｼｯｸM-PRO" panose="020F0600000000000000" pitchFamily="50" charset="-128"/>
                               <a:cs typeface="Courier New" pitchFamily="49" charset="0"/>
@@ -2339,7 +2339,7 @@
                         </m:sSubPr>
                         <m:e>
                           <m:r>
-                            <a:rPr lang="en-US" altLang="ja-JP" sz="1200" b="0" i="1" smtClean="0">
+                            <a:rPr lang="en-US" altLang="ja-JP" sz="1050" b="0" i="1" smtClean="0">
                               <a:latin typeface="Cambria Math"/>
                               <a:ea typeface="HG丸ｺﾞｼｯｸM-PRO" panose="020F0600000000000000" pitchFamily="50" charset="-128"/>
                               <a:cs typeface="Courier New" pitchFamily="49" charset="0"/>
@@ -2347,7 +2347,7 @@
                             <m:t>𝑐</m:t>
                           </m:r>
                           <m:r>
-                            <a:rPr lang="en-US" altLang="ja-JP" sz="1200" b="0" i="1" smtClean="0">
+                            <a:rPr lang="en-US" altLang="ja-JP" sz="1050" b="0" i="1" smtClean="0">
                               <a:latin typeface="Cambria Math"/>
                               <a:ea typeface="HG丸ｺﾞｼｯｸM-PRO" panose="020F0600000000000000" pitchFamily="50" charset="-128"/>
                               <a:cs typeface="Courier New" pitchFamily="49" charset="0"/>
@@ -2359,7 +2359,7 @@
                           <m:sSub>
                             <m:sSubPr>
                               <m:ctrlPr>
-                                <a:rPr lang="en-US" altLang="ja-JP" sz="1200" b="0" i="1" smtClean="0">
+                                <a:rPr lang="en-US" altLang="ja-JP" sz="1050" b="0" i="1" smtClean="0">
                                   <a:latin typeface="Cambria Math"/>
                                   <a:ea typeface="HG丸ｺﾞｼｯｸM-PRO" panose="020F0600000000000000" pitchFamily="50" charset="-128"/>
                                   <a:cs typeface="Courier New" pitchFamily="49" charset="0"/>
@@ -2368,7 +2368,7 @@
                             </m:sSubPr>
                             <m:e>
                               <m:r>
-                                <a:rPr lang="en-US" altLang="ja-JP" sz="1200" b="0" i="1" smtClean="0">
+                                <a:rPr lang="en-US" altLang="ja-JP" sz="1050" b="0" i="1" smtClean="0">
                                   <a:latin typeface="Cambria Math"/>
                                   <a:ea typeface="HG丸ｺﾞｼｯｸM-PRO" panose="020F0600000000000000" pitchFamily="50" charset="-128"/>
                                   <a:cs typeface="Courier New" pitchFamily="49" charset="0"/>
@@ -2378,7 +2378,7 @@
                             </m:e>
                             <m:sub>
                               <m:r>
-                                <a:rPr lang="en-US" altLang="ja-JP" sz="1200" b="0" i="1" smtClean="0">
+                                <a:rPr lang="en-US" altLang="ja-JP" sz="1050" b="0" i="1" smtClean="0">
                                   <a:latin typeface="Cambria Math"/>
                                   <a:ea typeface="HG丸ｺﾞｼｯｸM-PRO" panose="020F0600000000000000" pitchFamily="50" charset="-128"/>
                                   <a:cs typeface="Courier New" pitchFamily="49" charset="0"/>
@@ -2390,7 +2390,7 @@
                         </m:sub>
                       </m:sSub>
                       <m:r>
-                        <a:rPr lang="en-US" altLang="ja-JP" sz="1200" b="0" i="1" smtClean="0">
+                        <a:rPr lang="en-US" altLang="ja-JP" sz="1050" b="0" i="1" smtClean="0">
                           <a:latin typeface="Cambria Math"/>
                           <a:ea typeface="HG丸ｺﾞｼｯｸM-PRO" panose="020F0600000000000000" pitchFamily="50" charset="-128"/>
                           <a:cs typeface="Courier New" pitchFamily="49" charset="0"/>
@@ -2398,7 +2398,7 @@
                         <m:t>(</m:t>
                       </m:r>
                       <m:r>
-                        <a:rPr lang="en-US" altLang="ja-JP" sz="1200" b="0" i="1" smtClean="0">
+                        <a:rPr lang="en-US" altLang="ja-JP" sz="1050" b="0" i="1" smtClean="0">
                           <a:latin typeface="Cambria Math"/>
                           <a:ea typeface="HG丸ｺﾞｼｯｸM-PRO" panose="020F0600000000000000" pitchFamily="50" charset="-128"/>
                           <a:cs typeface="Courier New" pitchFamily="49" charset="0"/>
@@ -2406,7 +2406,7 @@
                         <m:t>𝑚</m:t>
                       </m:r>
                       <m:r>
-                        <a:rPr lang="en-US" altLang="ja-JP" sz="1200" b="0" i="1" smtClean="0">
+                        <a:rPr lang="en-US" altLang="ja-JP" sz="1050" b="0" i="1" smtClean="0">
                           <a:latin typeface="Cambria Math"/>
                           <a:ea typeface="HG丸ｺﾞｼｯｸM-PRO" panose="020F0600000000000000" pitchFamily="50" charset="-128"/>
                           <a:cs typeface="Courier New" pitchFamily="49" charset="0"/>
@@ -2416,7 +2416,7 @@
                     </m:oMath>
                   </m:oMathPara>
                 </a14:m>
-                <a:endParaRPr lang="ja-JP" altLang="en-US" sz="1200">
+                <a:endParaRPr lang="ja-JP" altLang="en-US" sz="1050">
                   <a:latin typeface="HG丸ｺﾞｼｯｸM-PRO" panose="020F0600000000000000" pitchFamily="50" charset="-128"/>
                   <a:ea typeface="HG丸ｺﾞｼｯｸM-PRO" panose="020F0600000000000000" pitchFamily="50" charset="-128"/>
                   <a:cs typeface="Courier New" pitchFamily="49" charset="0"/>
@@ -2425,7 +2425,7 @@
             </p:txBody>
           </p:sp>
         </mc:Choice>
-        <mc:Fallback xmlns="">
+        <mc:Fallback>
           <p:sp>
             <p:nvSpPr>
               <p:cNvPr id="17" name="テキスト ボックス 16"/>
@@ -2437,7 +2437,7 @@
             <p:spPr>
               <a:xfrm>
                 <a:off x="0" y="2140447"/>
-                <a:ext cx="936000" cy="292901"/>
+                <a:ext cx="936000" cy="267766"/>
               </a:xfrm>
               <a:prstGeom prst="rect">
                 <a:avLst/>
@@ -2445,7 +2445,7 @@
               <a:blipFill rotWithShape="1">
                 <a:blip r:embed="rId3"/>
                 <a:stretch>
-                  <a:fillRect b="-4167"/>
+                  <a:fillRect/>
                 </a:stretch>
               </a:blipFill>
               <a:ln w="12700" cap="rnd">
@@ -2468,8 +2468,8 @@
           </p:sp>
         </mc:Fallback>
       </mc:AlternateContent>
-      <mc:AlternateContent xmlns:mc="http://schemas.openxmlformats.org/markup-compatibility/2006" xmlns:a14="http://schemas.microsoft.com/office/drawing/2010/main">
-        <mc:Choice Requires="a14">
+      <mc:AlternateContent xmlns:mc="http://schemas.openxmlformats.org/markup-compatibility/2006">
+        <mc:Choice xmlns:a14="http://schemas.microsoft.com/office/drawing/2010/main" Requires="a14">
           <p:sp>
             <p:nvSpPr>
               <p:cNvPr id="18" name="テキスト ボックス 17"/>
@@ -2479,7 +2479,7 @@
             <p:spPr>
               <a:xfrm>
                 <a:off x="1" y="2551227"/>
-                <a:ext cx="936000" cy="292901"/>
+                <a:ext cx="936000" cy="267766"/>
               </a:xfrm>
               <a:prstGeom prst="rect">
                 <a:avLst/>
@@ -2504,7 +2504,7 @@
                     </m:oMathParaPr>
                     <m:oMath xmlns:m="http://schemas.openxmlformats.org/officeDocument/2006/math">
                       <m:r>
-                        <a:rPr lang="en-US" altLang="ja-JP" sz="1200" b="0" i="1" smtClean="0">
+                        <a:rPr lang="en-US" altLang="ja-JP" sz="1050" b="0" i="1" smtClean="0">
                           <a:latin typeface="Cambria Math"/>
                           <a:ea typeface="HG丸ｺﾞｼｯｸM-PRO" panose="020F0600000000000000" pitchFamily="50" charset="-128"/>
                           <a:cs typeface="Courier New" pitchFamily="49" charset="0"/>
@@ -2514,7 +2514,7 @@
                       <m:sSub>
                         <m:sSubPr>
                           <m:ctrlPr>
-                            <a:rPr lang="en-US" altLang="ja-JP" sz="1200" b="0" i="1" smtClean="0">
+                            <a:rPr lang="en-US" altLang="ja-JP" sz="1050" b="0" i="1" smtClean="0">
                               <a:latin typeface="Cambria Math"/>
                               <a:ea typeface="HG丸ｺﾞｼｯｸM-PRO" panose="020F0600000000000000" pitchFamily="50" charset="-128"/>
                               <a:cs typeface="Courier New" pitchFamily="49" charset="0"/>
@@ -2523,7 +2523,7 @@
                         </m:sSubPr>
                         <m:e>
                           <m:r>
-                            <a:rPr lang="en-US" altLang="ja-JP" sz="1200" b="0" i="1" smtClean="0">
+                            <a:rPr lang="en-US" altLang="ja-JP" sz="1050" b="0" i="1" smtClean="0">
                               <a:latin typeface="Cambria Math"/>
                               <a:ea typeface="HG丸ｺﾞｼｯｸM-PRO" panose="020F0600000000000000" pitchFamily="50" charset="-128"/>
                               <a:cs typeface="Courier New" pitchFamily="49" charset="0"/>
@@ -2535,7 +2535,7 @@
                           <m:sSub>
                             <m:sSubPr>
                               <m:ctrlPr>
-                                <a:rPr lang="en-US" altLang="ja-JP" sz="1200" b="0" i="1" smtClean="0">
+                                <a:rPr lang="en-US" altLang="ja-JP" sz="1050" b="0" i="1" smtClean="0">
                                   <a:latin typeface="Cambria Math"/>
                                   <a:ea typeface="HG丸ｺﾞｼｯｸM-PRO" panose="020F0600000000000000" pitchFamily="50" charset="-128"/>
                                   <a:cs typeface="Courier New" pitchFamily="49" charset="0"/>
@@ -2544,7 +2544,7 @@
                             </m:sSubPr>
                             <m:e>
                               <m:r>
-                                <a:rPr lang="en-US" altLang="ja-JP" sz="1200" b="0" i="1" smtClean="0">
+                                <a:rPr lang="en-US" altLang="ja-JP" sz="1050" b="0" i="1" smtClean="0">
                                   <a:latin typeface="Cambria Math"/>
                                   <a:ea typeface="HG丸ｺﾞｼｯｸM-PRO" panose="020F0600000000000000" pitchFamily="50" charset="-128"/>
                                   <a:cs typeface="Courier New" pitchFamily="49" charset="0"/>
@@ -2554,7 +2554,7 @@
                             </m:e>
                             <m:sub>
                               <m:r>
-                                <a:rPr lang="en-US" altLang="ja-JP" sz="1200" b="0" i="1" smtClean="0">
+                                <a:rPr lang="en-US" altLang="ja-JP" sz="1050" b="0" i="1" smtClean="0">
                                   <a:latin typeface="Cambria Math"/>
                                   <a:ea typeface="HG丸ｺﾞｼｯｸM-PRO" panose="020F0600000000000000" pitchFamily="50" charset="-128"/>
                                   <a:cs typeface="Courier New" pitchFamily="49" charset="0"/>
@@ -2568,7 +2568,7 @@
                       <m:d>
                         <m:dPr>
                           <m:ctrlPr>
-                            <a:rPr lang="en-US" altLang="ja-JP" sz="1200" b="0" i="1" smtClean="0">
+                            <a:rPr lang="en-US" altLang="ja-JP" sz="1050" b="0" i="1" smtClean="0">
                               <a:latin typeface="Cambria Math"/>
                               <a:ea typeface="HG丸ｺﾞｼｯｸM-PRO" panose="020F0600000000000000" pitchFamily="50" charset="-128"/>
                               <a:cs typeface="Courier New" pitchFamily="49" charset="0"/>
@@ -2579,7 +2579,7 @@
                           <m:sSub>
                             <m:sSubPr>
                               <m:ctrlPr>
-                                <a:rPr lang="en-US" altLang="ja-JP" sz="1200" b="0" i="1" smtClean="0">
+                                <a:rPr lang="en-US" altLang="ja-JP" sz="1050" b="0" i="1" smtClean="0">
                                   <a:latin typeface="Cambria Math"/>
                                   <a:ea typeface="HG丸ｺﾞｼｯｸM-PRO" panose="020F0600000000000000" pitchFamily="50" charset="-128"/>
                                   <a:cs typeface="Courier New" pitchFamily="49" charset="0"/>
@@ -2588,7 +2588,7 @@
                             </m:sSubPr>
                             <m:e>
                               <m:r>
-                                <a:rPr lang="en-US" altLang="ja-JP" sz="1200" b="0" i="1" smtClean="0">
+                                <a:rPr lang="en-US" altLang="ja-JP" sz="1050" b="0" i="1" smtClean="0">
                                   <a:latin typeface="Cambria Math"/>
                                   <a:ea typeface="HG丸ｺﾞｼｯｸM-PRO" panose="020F0600000000000000" pitchFamily="50" charset="-128"/>
                                   <a:cs typeface="Courier New" pitchFamily="49" charset="0"/>
@@ -2598,7 +2598,7 @@
                             </m:e>
                             <m:sub>
                               <m:r>
-                                <a:rPr lang="en-US" altLang="ja-JP" sz="1200" b="0" i="1" smtClean="0">
+                                <a:rPr lang="en-US" altLang="ja-JP" sz="1050" b="0" i="1" smtClean="0">
                                   <a:latin typeface="Cambria Math"/>
                                   <a:ea typeface="HG丸ｺﾞｼｯｸM-PRO" panose="020F0600000000000000" pitchFamily="50" charset="-128"/>
                                   <a:cs typeface="Courier New" pitchFamily="49" charset="0"/>
@@ -2612,7 +2612,7 @@
                     </m:oMath>
                   </m:oMathPara>
                 </a14:m>
-                <a:endParaRPr lang="ja-JP" altLang="en-US" sz="1200">
+                <a:endParaRPr lang="ja-JP" altLang="en-US" sz="1050">
                   <a:latin typeface="HG丸ｺﾞｼｯｸM-PRO" panose="020F0600000000000000" pitchFamily="50" charset="-128"/>
                   <a:ea typeface="HG丸ｺﾞｼｯｸM-PRO" panose="020F0600000000000000" pitchFamily="50" charset="-128"/>
                   <a:cs typeface="Courier New" pitchFamily="49" charset="0"/>
@@ -2621,7 +2621,7 @@
             </p:txBody>
           </p:sp>
         </mc:Choice>
-        <mc:Fallback xmlns="">
+        <mc:Fallback>
           <p:sp>
             <p:nvSpPr>
               <p:cNvPr id="18" name="テキスト ボックス 17"/>
@@ -2633,7 +2633,7 @@
             <p:spPr>
               <a:xfrm>
                 <a:off x="1" y="2551227"/>
-                <a:ext cx="936000" cy="292901"/>
+                <a:ext cx="936000" cy="267766"/>
               </a:xfrm>
               <a:prstGeom prst="rect">
                 <a:avLst/>
@@ -2664,8 +2664,8 @@
           </p:sp>
         </mc:Fallback>
       </mc:AlternateContent>
-      <mc:AlternateContent xmlns:mc="http://schemas.openxmlformats.org/markup-compatibility/2006" xmlns:a14="http://schemas.microsoft.com/office/drawing/2010/main">
-        <mc:Choice Requires="a14">
+      <mc:AlternateContent xmlns:mc="http://schemas.openxmlformats.org/markup-compatibility/2006">
+        <mc:Choice xmlns:a14="http://schemas.microsoft.com/office/drawing/2010/main" Requires="a14">
           <p:sp>
             <p:nvSpPr>
               <p:cNvPr id="19" name="テキスト ボックス 18"/>
@@ -2675,7 +2675,7 @@
             <p:spPr>
               <a:xfrm>
                 <a:off x="1" y="2890820"/>
-                <a:ext cx="936000" cy="292901"/>
+                <a:ext cx="936000" cy="267766"/>
               </a:xfrm>
               <a:prstGeom prst="rect">
                 <a:avLst/>
@@ -2700,7 +2700,7 @@
                     </m:oMathParaPr>
                     <m:oMath xmlns:m="http://schemas.openxmlformats.org/officeDocument/2006/math">
                       <m:r>
-                        <a:rPr lang="en-US" altLang="ja-JP" sz="1200" b="0" i="1" smtClean="0">
+                        <a:rPr lang="en-US" altLang="ja-JP" sz="1050" b="0" i="1" smtClean="0">
                           <a:latin typeface="Cambria Math"/>
                           <a:ea typeface="HG丸ｺﾞｼｯｸM-PRO" panose="020F0600000000000000" pitchFamily="50" charset="-128"/>
                           <a:cs typeface="Courier New" pitchFamily="49" charset="0"/>
@@ -2710,7 +2710,7 @@
                       <m:sSub>
                         <m:sSubPr>
                           <m:ctrlPr>
-                            <a:rPr lang="en-US" altLang="ja-JP" sz="1200" b="0" i="1" smtClean="0">
+                            <a:rPr lang="en-US" altLang="ja-JP" sz="1050" b="0" i="1" smtClean="0">
                               <a:latin typeface="Cambria Math"/>
                               <a:ea typeface="HG丸ｺﾞｼｯｸM-PRO" panose="020F0600000000000000" pitchFamily="50" charset="-128"/>
                               <a:cs typeface="Courier New" pitchFamily="49" charset="0"/>
@@ -2719,7 +2719,7 @@
                         </m:sSubPr>
                         <m:e>
                           <m:r>
-                            <a:rPr lang="en-US" altLang="ja-JP" sz="1200" b="0" i="1" smtClean="0">
+                            <a:rPr lang="en-US" altLang="ja-JP" sz="1050" b="0" i="1" smtClean="0">
                               <a:latin typeface="Cambria Math"/>
                               <a:ea typeface="HG丸ｺﾞｼｯｸM-PRO" panose="020F0600000000000000" pitchFamily="50" charset="-128"/>
                               <a:cs typeface="Courier New" pitchFamily="49" charset="0"/>
@@ -2727,7 +2727,7 @@
                             <m:t>𝑐</m:t>
                           </m:r>
                           <m:r>
-                            <a:rPr lang="en-US" altLang="ja-JP" sz="1200" b="0" i="1" smtClean="0">
+                            <a:rPr lang="en-US" altLang="ja-JP" sz="1050" b="0" i="1" smtClean="0">
                               <a:latin typeface="Cambria Math"/>
                               <a:ea typeface="HG丸ｺﾞｼｯｸM-PRO" panose="020F0600000000000000" pitchFamily="50" charset="-128"/>
                               <a:cs typeface="Courier New" pitchFamily="49" charset="0"/>
@@ -2739,7 +2739,7 @@
                           <m:sSub>
                             <m:sSubPr>
                               <m:ctrlPr>
-                                <a:rPr lang="en-US" altLang="ja-JP" sz="1200" b="0" i="1" smtClean="0">
+                                <a:rPr lang="en-US" altLang="ja-JP" sz="1050" b="0" i="1" smtClean="0">
                                   <a:latin typeface="Cambria Math"/>
                                   <a:ea typeface="HG丸ｺﾞｼｯｸM-PRO" panose="020F0600000000000000" pitchFamily="50" charset="-128"/>
                                   <a:cs typeface="Courier New" pitchFamily="49" charset="0"/>
@@ -2748,7 +2748,7 @@
                             </m:sSubPr>
                             <m:e>
                               <m:r>
-                                <a:rPr lang="en-US" altLang="ja-JP" sz="1200" b="0" i="1" smtClean="0">
+                                <a:rPr lang="en-US" altLang="ja-JP" sz="1050" b="0" i="1" smtClean="0">
                                   <a:latin typeface="Cambria Math"/>
                                   <a:ea typeface="HG丸ｺﾞｼｯｸM-PRO" panose="020F0600000000000000" pitchFamily="50" charset="-128"/>
                                   <a:cs typeface="Courier New" pitchFamily="49" charset="0"/>
@@ -2758,7 +2758,7 @@
                             </m:e>
                             <m:sub>
                               <m:r>
-                                <a:rPr lang="en-US" altLang="ja-JP" sz="1200" b="0" i="1" smtClean="0">
+                                <a:rPr lang="en-US" altLang="ja-JP" sz="1050" b="0" i="1" smtClean="0">
                                   <a:latin typeface="Cambria Math"/>
                                   <a:ea typeface="HG丸ｺﾞｼｯｸM-PRO" panose="020F0600000000000000" pitchFamily="50" charset="-128"/>
                                   <a:cs typeface="Courier New" pitchFamily="49" charset="0"/>
@@ -2770,7 +2770,7 @@
                         </m:sub>
                       </m:sSub>
                       <m:r>
-                        <a:rPr lang="en-US" altLang="ja-JP" sz="1200" b="0" i="1" smtClean="0">
+                        <a:rPr lang="en-US" altLang="ja-JP" sz="1050" b="0" i="1" smtClean="0">
                           <a:latin typeface="Cambria Math"/>
                           <a:ea typeface="HG丸ｺﾞｼｯｸM-PRO" panose="020F0600000000000000" pitchFamily="50" charset="-128"/>
                           <a:cs typeface="Courier New" pitchFamily="49" charset="0"/>
@@ -2780,7 +2780,7 @@
                       <m:sSup>
                         <m:sSupPr>
                           <m:ctrlPr>
-                            <a:rPr lang="en-US" altLang="ja-JP" sz="1200" b="0" i="1" smtClean="0">
+                            <a:rPr lang="en-US" altLang="ja-JP" sz="1050" b="0" i="1" smtClean="0">
                               <a:latin typeface="Cambria Math"/>
                               <a:ea typeface="HG丸ｺﾞｼｯｸM-PRO" panose="020F0600000000000000" pitchFamily="50" charset="-128"/>
                               <a:cs typeface="Courier New" pitchFamily="49" charset="0"/>
@@ -2789,7 +2789,7 @@
                         </m:sSupPr>
                         <m:e>
                           <m:r>
-                            <a:rPr lang="en-US" altLang="ja-JP" sz="1200" b="0" i="1" smtClean="0">
+                            <a:rPr lang="en-US" altLang="ja-JP" sz="1050" b="0" i="1" smtClean="0">
                               <a:latin typeface="Cambria Math"/>
                               <a:ea typeface="HG丸ｺﾞｼｯｸM-PRO" panose="020F0600000000000000" pitchFamily="50" charset="-128"/>
                               <a:cs typeface="Courier New" pitchFamily="49" charset="0"/>
@@ -2799,7 +2799,7 @@
                         </m:e>
                         <m:sup>
                           <m:r>
-                            <a:rPr lang="en-US" altLang="ja-JP" sz="1200" b="0" i="1" smtClean="0">
+                            <a:rPr lang="en-US" altLang="ja-JP" sz="1050" b="0" i="1" smtClean="0">
                               <a:latin typeface="Cambria Math"/>
                               <a:ea typeface="HG丸ｺﾞｼｯｸM-PRO" panose="020F0600000000000000" pitchFamily="50" charset="-128"/>
                               <a:cs typeface="Courier New" pitchFamily="49" charset="0"/>
@@ -2809,7 +2809,7 @@
                         </m:sup>
                       </m:sSup>
                       <m:r>
-                        <a:rPr lang="en-US" altLang="ja-JP" sz="1200" b="0" i="1" smtClean="0">
+                        <a:rPr lang="en-US" altLang="ja-JP" sz="1050" b="0" i="1" smtClean="0">
                           <a:latin typeface="Cambria Math"/>
                           <a:ea typeface="HG丸ｺﾞｼｯｸM-PRO" panose="020F0600000000000000" pitchFamily="50" charset="-128"/>
                           <a:cs typeface="Courier New" pitchFamily="49" charset="0"/>
@@ -2819,7 +2819,7 @@
                     </m:oMath>
                   </m:oMathPara>
                 </a14:m>
-                <a:endParaRPr lang="ja-JP" altLang="en-US" sz="1200">
+                <a:endParaRPr lang="ja-JP" altLang="en-US" sz="1050">
                   <a:latin typeface="HG丸ｺﾞｼｯｸM-PRO" panose="020F0600000000000000" pitchFamily="50" charset="-128"/>
                   <a:ea typeface="HG丸ｺﾞｼｯｸM-PRO" panose="020F0600000000000000" pitchFamily="50" charset="-128"/>
                   <a:cs typeface="Courier New" pitchFamily="49" charset="0"/>
@@ -2828,7 +2828,7 @@
             </p:txBody>
           </p:sp>
         </mc:Choice>
-        <mc:Fallback xmlns="">
+        <mc:Fallback>
           <p:sp>
             <p:nvSpPr>
               <p:cNvPr id="19" name="テキスト ボックス 18"/>
@@ -2840,7 +2840,7 @@
             <p:spPr>
               <a:xfrm>
                 <a:off x="1" y="2890820"/>
-                <a:ext cx="936000" cy="292901"/>
+                <a:ext cx="936000" cy="267766"/>
               </a:xfrm>
               <a:prstGeom prst="rect">
                 <a:avLst/>
@@ -2848,7 +2848,7 @@
               <a:blipFill rotWithShape="1">
                 <a:blip r:embed="rId5"/>
                 <a:stretch>
-                  <a:fillRect b="-4167"/>
+                  <a:fillRect/>
                 </a:stretch>
               </a:blipFill>
               <a:ln w="12700" cap="rnd">
@@ -2880,7 +2880,7 @@
         <p:spPr>
           <a:xfrm>
             <a:off x="371076" y="1814062"/>
-            <a:ext cx="223060" cy="211800"/>
+            <a:ext cx="210945" cy="200297"/>
           </a:xfrm>
           <a:prstGeom prst="ellipse">
             <a:avLst/>
@@ -2911,27 +2911,25 @@
           <a:lstStyle/>
           <a:p>
             <a:pPr algn="ctr"/>
-            <a:endParaRPr kumimoji="1" lang="ja-JP" altLang="en-US" sz="1200"/>
+            <a:endParaRPr kumimoji="1" lang="ja-JP" altLang="en-US" sz="1050"/>
           </a:p>
         </p:txBody>
       </p:sp>
       <p:cxnSp>
         <p:nvCxnSpPr>
           <p:cNvPr id="23" name="直線矢印コネクタ 22"/>
-          <p:cNvCxnSpPr>
-            <a:stCxn id="21" idx="7"/>
-          </p:cNvCxnSpPr>
+          <p:cNvCxnSpPr/>
           <p:nvPr/>
         </p:nvCxnSpPr>
         <p:spPr>
           <a:xfrm flipV="1">
-            <a:off x="561470" y="1335509"/>
-            <a:ext cx="1120590" cy="509570"/>
+            <a:off x="474260" y="1335509"/>
+            <a:ext cx="1207800" cy="445524"/>
           </a:xfrm>
           <a:prstGeom prst="straightConnector1">
             <a:avLst/>
           </a:prstGeom>
-          <a:ln w="6350">
+          <a:ln w="3175">
             <a:solidFill>
               <a:schemeClr val="tx1"/>
             </a:solidFill>
@@ -2961,13 +2959,13 @@
         </p:nvCxnSpPr>
         <p:spPr>
           <a:xfrm flipV="1">
-            <a:off x="540443" y="1335509"/>
-            <a:ext cx="1141617" cy="1320114"/>
+            <a:off x="457200" y="1335510"/>
+            <a:ext cx="1224860" cy="1295096"/>
           </a:xfrm>
           <a:prstGeom prst="straightConnector1">
             <a:avLst/>
           </a:prstGeom>
-          <a:ln w="6350">
+          <a:ln w="3175">
             <a:solidFill>
               <a:schemeClr val="tx1"/>
             </a:solidFill>
@@ -2998,7 +2996,7 @@
         <p:spPr>
           <a:xfrm>
             <a:off x="1624426" y="1150263"/>
-            <a:ext cx="1107996" cy="276999"/>
+            <a:ext cx="992579" cy="253916"/>
           </a:xfrm>
           <a:prstGeom prst="rect">
             <a:avLst/>
@@ -3016,14 +3014,14 @@
           <a:lstStyle/>
           <a:p>
             <a:r>
-              <a:rPr lang="ja-JP" altLang="en-US" sz="1200" smtClean="0">
+              <a:rPr lang="ja-JP" altLang="en-US" sz="1050" smtClean="0">
                 <a:latin typeface="HG丸ｺﾞｼｯｸM-PRO" panose="020F0600000000000000" pitchFamily="50" charset="-128"/>
                 <a:ea typeface="HG丸ｺﾞｼｯｸM-PRO" panose="020F0600000000000000" pitchFamily="50" charset="-128"/>
                 <a:cs typeface="Courier New" pitchFamily="49" charset="0"/>
               </a:rPr>
               <a:t>いつも同じ鍵</a:t>
             </a:r>
-            <a:endParaRPr lang="ja-JP" altLang="en-US" sz="1200">
+            <a:endParaRPr lang="ja-JP" altLang="en-US" sz="1050">
               <a:latin typeface="HG丸ｺﾞｼｯｸM-PRO" panose="020F0600000000000000" pitchFamily="50" charset="-128"/>
               <a:ea typeface="HG丸ｺﾞｼｯｸM-PRO" panose="020F0600000000000000" pitchFamily="50" charset="-128"/>
               <a:cs typeface="Courier New" pitchFamily="49" charset="0"/>
@@ -3031,8 +3029,8 @@
           </a:p>
         </p:txBody>
       </p:sp>
-      <mc:AlternateContent xmlns:mc="http://schemas.openxmlformats.org/markup-compatibility/2006" xmlns:a14="http://schemas.microsoft.com/office/drawing/2010/main">
-        <mc:Choice Requires="a14">
+      <mc:AlternateContent xmlns:mc="http://schemas.openxmlformats.org/markup-compatibility/2006">
+        <mc:Choice xmlns:a14="http://schemas.microsoft.com/office/drawing/2010/main" Requires="a14">
           <p:sp>
             <p:nvSpPr>
               <p:cNvPr id="33" name="テキスト ボックス 32"/>
@@ -3042,7 +3040,7 @@
             <p:spPr>
               <a:xfrm>
                 <a:off x="3510136" y="1583329"/>
-                <a:ext cx="827791" cy="276999"/>
+                <a:ext cx="747962" cy="253916"/>
               </a:xfrm>
               <a:prstGeom prst="rect">
                 <a:avLst/>
@@ -3060,7 +3058,7 @@
               <a:lstStyle/>
               <a:p>
                 <a:r>
-                  <a:rPr lang="ja-JP" altLang="en-US" sz="1200" smtClean="0">
+                  <a:rPr lang="ja-JP" altLang="en-US" sz="1050" smtClean="0">
                     <a:latin typeface="HG丸ｺﾞｼｯｸM-PRO" panose="020F0600000000000000" pitchFamily="50" charset="-128"/>
                     <a:ea typeface="HG丸ｺﾞｼｯｸM-PRO" panose="020F0600000000000000" pitchFamily="50" charset="-128"/>
                     <a:cs typeface="Courier New" pitchFamily="49" charset="0"/>
@@ -3072,7 +3070,7 @@
                     <m:sSub>
                       <m:sSubPr>
                         <m:ctrlPr>
-                          <a:rPr lang="en-US" altLang="ja-JP" sz="1200" b="0" i="1" smtClean="0">
+                          <a:rPr lang="en-US" altLang="ja-JP" sz="1050" b="0" i="1" smtClean="0">
                             <a:latin typeface="Cambria Math"/>
                             <a:ea typeface="HG丸ｺﾞｼｯｸM-PRO" panose="020F0600000000000000" pitchFamily="50" charset="-128"/>
                             <a:cs typeface="Courier New" pitchFamily="49" charset="0"/>
@@ -3081,7 +3079,7 @@
                       </m:sSubPr>
                       <m:e>
                         <m:r>
-                          <a:rPr lang="en-US" altLang="ja-JP" sz="1200" b="0" i="1" smtClean="0">
+                          <a:rPr lang="en-US" altLang="ja-JP" sz="1050" b="0" i="1" smtClean="0">
                             <a:latin typeface="Cambria Math"/>
                             <a:ea typeface="HG丸ｺﾞｼｯｸM-PRO" panose="020F0600000000000000" pitchFamily="50" charset="-128"/>
                             <a:cs typeface="Courier New" pitchFamily="49" charset="0"/>
@@ -3091,7 +3089,7 @@
                       </m:e>
                       <m:sub>
                         <m:r>
-                          <a:rPr lang="en-US" altLang="ja-JP" sz="1200" b="0" i="1" smtClean="0">
+                          <a:rPr lang="en-US" altLang="ja-JP" sz="1050" b="0" i="1" smtClean="0">
                             <a:latin typeface="Cambria Math"/>
                             <a:ea typeface="HG丸ｺﾞｼｯｸM-PRO" panose="020F0600000000000000" pitchFamily="50" charset="-128"/>
                             <a:cs typeface="Courier New" pitchFamily="49" charset="0"/>
@@ -3102,7 +3100,7 @@
                     </m:sSub>
                   </m:oMath>
                 </a14:m>
-                <a:endParaRPr lang="ja-JP" altLang="en-US" sz="1200">
+                <a:endParaRPr lang="ja-JP" altLang="en-US" sz="1050">
                   <a:latin typeface="HG丸ｺﾞｼｯｸM-PRO" panose="020F0600000000000000" pitchFamily="50" charset="-128"/>
                   <a:ea typeface="HG丸ｺﾞｼｯｸM-PRO" panose="020F0600000000000000" pitchFamily="50" charset="-128"/>
                   <a:cs typeface="Courier New" pitchFamily="49" charset="0"/>
@@ -3111,7 +3109,7 @@
             </p:txBody>
           </p:sp>
         </mc:Choice>
-        <mc:Fallback xmlns="">
+        <mc:Fallback>
           <p:sp>
             <p:nvSpPr>
               <p:cNvPr id="33" name="テキスト ボックス 32"/>
@@ -3123,7 +3121,7 @@
             <p:spPr>
               <a:xfrm>
                 <a:off x="3510136" y="1583329"/>
-                <a:ext cx="827791" cy="276999"/>
+                <a:ext cx="747962" cy="253916"/>
               </a:xfrm>
               <a:prstGeom prst="rect">
                 <a:avLst/>
@@ -3131,7 +3129,7 @@
               <a:blipFill rotWithShape="1">
                 <a:blip r:embed="rId6"/>
                 <a:stretch>
-                  <a:fillRect l="-735" b="-17778"/>
+                  <a:fillRect b="-14634"/>
                 </a:stretch>
               </a:blipFill>
               <a:ln w="12700" cap="rnd">
@@ -3168,7 +3166,7 @@
           <a:prstGeom prst="straightConnector1">
             <a:avLst/>
           </a:prstGeom>
-          <a:ln w="9525">
+          <a:ln w="3175">
             <a:solidFill>
               <a:schemeClr val="tx1"/>
             </a:solidFill>
@@ -3199,7 +3197,7 @@
         <p:spPr>
           <a:xfrm>
             <a:off x="1316650" y="1612013"/>
-            <a:ext cx="1723549" cy="276999"/>
+            <a:ext cx="1531188" cy="253916"/>
           </a:xfrm>
           <a:prstGeom prst="rect">
             <a:avLst/>
@@ -3217,14 +3215,14 @@
           <a:lstStyle/>
           <a:p>
             <a:r>
-              <a:rPr lang="ja-JP" altLang="en-US" sz="1200" smtClean="0">
+              <a:rPr lang="ja-JP" altLang="en-US" sz="1050" smtClean="0">
                 <a:latin typeface="HG丸ｺﾞｼｯｸM-PRO" panose="020F0600000000000000" pitchFamily="50" charset="-128"/>
                 <a:ea typeface="HG丸ｺﾞｼｯｸM-PRO" panose="020F0600000000000000" pitchFamily="50" charset="-128"/>
                 <a:cs typeface="Courier New" pitchFamily="49" charset="0"/>
               </a:rPr>
               <a:t>セッション鍵の暗号化</a:t>
             </a:r>
-            <a:endParaRPr lang="ja-JP" altLang="en-US" sz="1200">
+            <a:endParaRPr lang="ja-JP" altLang="en-US" sz="1050">
               <a:latin typeface="HG丸ｺﾞｼｯｸM-PRO" panose="020F0600000000000000" pitchFamily="50" charset="-128"/>
               <a:ea typeface="HG丸ｺﾞｼｯｸM-PRO" panose="020F0600000000000000" pitchFamily="50" charset="-128"/>
               <a:cs typeface="Courier New" pitchFamily="49" charset="0"/>
@@ -3241,7 +3239,7 @@
         <p:spPr>
           <a:xfrm>
             <a:off x="1682060" y="2014359"/>
-            <a:ext cx="1107996" cy="276999"/>
+            <a:ext cx="992579" cy="253916"/>
           </a:xfrm>
           <a:prstGeom prst="rect">
             <a:avLst/>
@@ -3259,14 +3257,14 @@
           <a:lstStyle/>
           <a:p>
             <a:r>
-              <a:rPr lang="ja-JP" altLang="en-US" sz="1200" smtClean="0">
+              <a:rPr lang="ja-JP" altLang="en-US" sz="1050" smtClean="0">
                 <a:latin typeface="HG丸ｺﾞｼｯｸM-PRO" panose="020F0600000000000000" pitchFamily="50" charset="-128"/>
                 <a:ea typeface="HG丸ｺﾞｼｯｸM-PRO" panose="020F0600000000000000" pitchFamily="50" charset="-128"/>
                 <a:cs typeface="Courier New" pitchFamily="49" charset="0"/>
               </a:rPr>
               <a:t>本文の暗号化</a:t>
             </a:r>
-            <a:endParaRPr lang="ja-JP" altLang="en-US" sz="1200">
+            <a:endParaRPr lang="ja-JP" altLang="en-US" sz="1050">
               <a:latin typeface="HG丸ｺﾞｼｯｸM-PRO" panose="020F0600000000000000" pitchFamily="50" charset="-128"/>
               <a:ea typeface="HG丸ｺﾞｼｯｸM-PRO" panose="020F0600000000000000" pitchFamily="50" charset="-128"/>
               <a:cs typeface="Courier New" pitchFamily="49" charset="0"/>
@@ -3288,7 +3286,7 @@
           <a:prstGeom prst="straightConnector1">
             <a:avLst/>
           </a:prstGeom>
-          <a:ln w="9525">
+          <a:ln w="3175">
             <a:solidFill>
               <a:schemeClr val="tx1"/>
             </a:solidFill>
@@ -3324,7 +3322,7 @@
           <a:prstGeom prst="straightConnector1">
             <a:avLst/>
           </a:prstGeom>
-          <a:ln w="9525">
+          <a:ln w="3175">
             <a:solidFill>
               <a:schemeClr val="tx1"/>
             </a:solidFill>
@@ -3355,7 +3353,7 @@
         <p:spPr>
           <a:xfrm>
             <a:off x="1315541" y="2391891"/>
-            <a:ext cx="1723549" cy="276999"/>
+            <a:ext cx="1531188" cy="253916"/>
           </a:xfrm>
           <a:prstGeom prst="rect">
             <a:avLst/>
@@ -3373,14 +3371,14 @@
           <a:lstStyle/>
           <a:p>
             <a:r>
-              <a:rPr lang="ja-JP" altLang="en-US" sz="1200" smtClean="0">
+              <a:rPr lang="ja-JP" altLang="en-US" sz="1050" smtClean="0">
                 <a:latin typeface="HG丸ｺﾞｼｯｸM-PRO" panose="020F0600000000000000" pitchFamily="50" charset="-128"/>
                 <a:ea typeface="HG丸ｺﾞｼｯｸM-PRO" panose="020F0600000000000000" pitchFamily="50" charset="-128"/>
                 <a:cs typeface="Courier New" pitchFamily="49" charset="0"/>
               </a:rPr>
               <a:t>セッション鍵の暗号化</a:t>
             </a:r>
-            <a:endParaRPr lang="ja-JP" altLang="en-US" sz="1200">
+            <a:endParaRPr lang="ja-JP" altLang="en-US" sz="1050">
               <a:latin typeface="HG丸ｺﾞｼｯｸM-PRO" panose="020F0600000000000000" pitchFamily="50" charset="-128"/>
               <a:ea typeface="HG丸ｺﾞｼｯｸM-PRO" panose="020F0600000000000000" pitchFamily="50" charset="-128"/>
               <a:cs typeface="Courier New" pitchFamily="49" charset="0"/>
@@ -3397,7 +3395,7 @@
         <p:spPr>
           <a:xfrm>
             <a:off x="1680951" y="2794237"/>
-            <a:ext cx="1107996" cy="276999"/>
+            <a:ext cx="992579" cy="253916"/>
           </a:xfrm>
           <a:prstGeom prst="rect">
             <a:avLst/>
@@ -3415,14 +3413,14 @@
           <a:lstStyle/>
           <a:p>
             <a:r>
-              <a:rPr lang="ja-JP" altLang="en-US" sz="1200" smtClean="0">
+              <a:rPr lang="ja-JP" altLang="en-US" sz="1050" smtClean="0">
                 <a:latin typeface="HG丸ｺﾞｼｯｸM-PRO" panose="020F0600000000000000" pitchFamily="50" charset="-128"/>
                 <a:ea typeface="HG丸ｺﾞｼｯｸM-PRO" panose="020F0600000000000000" pitchFamily="50" charset="-128"/>
                 <a:cs typeface="Courier New" pitchFamily="49" charset="0"/>
               </a:rPr>
               <a:t>本文の暗号化</a:t>
             </a:r>
-            <a:endParaRPr lang="ja-JP" altLang="en-US" sz="1200">
+            <a:endParaRPr lang="ja-JP" altLang="en-US" sz="1050">
               <a:latin typeface="HG丸ｺﾞｼｯｸM-PRO" panose="020F0600000000000000" pitchFamily="50" charset="-128"/>
               <a:ea typeface="HG丸ｺﾞｼｯｸM-PRO" panose="020F0600000000000000" pitchFamily="50" charset="-128"/>
               <a:cs typeface="Courier New" pitchFamily="49" charset="0"/>
@@ -3439,7 +3437,7 @@
         <p:spPr>
           <a:xfrm>
             <a:off x="341784" y="2655622"/>
-            <a:ext cx="223060" cy="211800"/>
+            <a:ext cx="216024" cy="205119"/>
           </a:xfrm>
           <a:prstGeom prst="ellipse">
             <a:avLst/>
@@ -3470,7 +3468,7 @@
           <a:lstStyle/>
           <a:p>
             <a:pPr algn="ctr"/>
-            <a:endParaRPr kumimoji="1" lang="ja-JP" altLang="en-US" sz="1200"/>
+            <a:endParaRPr kumimoji="1" lang="ja-JP" altLang="en-US" sz="1050"/>
           </a:p>
         </p:txBody>
       </p:sp>

</xml_diff>